<commit_message>
Oops, wrong version of slides
</commit_message>
<xml_diff>
--- a/teaching/autumn2025-intro-to-complexity/2025-10-01-configurations-time-space-encoding.pptx
+++ b/teaching/autumn2025-intro-to-complexity/2025-10-01-configurations-time-space-encoding.pptx
@@ -4957,7 +4957,13 @@
                           <a:rPr lang="en-US" b="0" i="1" smtClean="0">
                             <a:latin typeface="Cambria Math" panose="02040503050406030204" pitchFamily="18" charset="0"/>
                           </a:rPr>
-                          <m:t>−1</m:t>
+                          <m:t>−</m:t>
+                        </m:r>
+                        <m:r>
+                          <a:rPr lang="en-US" b="0" i="1" smtClean="0">
+                            <a:latin typeface="Cambria Math" panose="02040503050406030204" pitchFamily="18" charset="0"/>
+                          </a:rPr>
+                          <m:t>1</m:t>
                         </m:r>
                       </m:sub>
                     </m:sSub>
@@ -5210,7 +5216,13 @@
                           <a:rPr lang="en-US" b="0" i="1" smtClean="0">
                             <a:latin typeface="Cambria Math" panose="02040503050406030204" pitchFamily="18" charset="0"/>
                           </a:rPr>
-                          <m:t>′,</m:t>
+                          <m:t>′</m:t>
+                        </m:r>
+                        <m:r>
+                          <a:rPr lang="en-US" b="0" i="1" smtClean="0">
+                            <a:latin typeface="Cambria Math" panose="02040503050406030204" pitchFamily="18" charset="0"/>
+                          </a:rPr>
+                          <m:t>,</m:t>
                         </m:r>
                         <m:r>
                           <a:rPr lang="en-US" b="0" i="1" smtClean="0">
@@ -5361,7 +5373,13 @@
                           <a:rPr lang="en-US" b="0" i="1" smtClean="0">
                             <a:latin typeface="Cambria Math" panose="02040503050406030204" pitchFamily="18" charset="0"/>
                           </a:rPr>
-                          <m:t>−1</m:t>
+                          <m:t>−</m:t>
+                        </m:r>
+                        <m:r>
+                          <a:rPr lang="en-US" b="0" i="1" smtClean="0">
+                            <a:latin typeface="Cambria Math" panose="02040503050406030204" pitchFamily="18" charset="0"/>
+                          </a:rPr>
+                          <m:t>1</m:t>
                         </m:r>
                       </m:sub>
                     </m:sSub>
@@ -5520,7 +5538,13 @@
                       <a:rPr lang="en-US" sz="2400" b="0" i="1" smtClean="0">
                         <a:latin typeface="Cambria Math" panose="02040503050406030204" pitchFamily="18" charset="0"/>
                       </a:rPr>
-                      <m:t>=1</m:t>
+                      <m:t>=</m:t>
+                    </m:r>
+                    <m:r>
+                      <a:rPr lang="en-US" sz="2400" b="0" i="1" smtClean="0">
+                        <a:latin typeface="Cambria Math" panose="02040503050406030204" pitchFamily="18" charset="0"/>
+                      </a:rPr>
+                      <m:t>1</m:t>
                     </m:r>
                   </m:oMath>
                 </a14:m>
@@ -5645,7 +5669,13 @@
                           <a:rPr lang="en-US" sz="2400" b="0" i="1" smtClean="0">
                             <a:latin typeface="Cambria Math" panose="02040503050406030204" pitchFamily="18" charset="0"/>
                           </a:rPr>
-                          <m:t>−1</m:t>
+                          <m:t>−</m:t>
+                        </m:r>
+                        <m:r>
+                          <a:rPr lang="en-US" sz="2400" b="0" i="1" smtClean="0">
+                            <a:latin typeface="Cambria Math" panose="02040503050406030204" pitchFamily="18" charset="0"/>
+                          </a:rPr>
+                          <m:t>1</m:t>
                         </m:r>
                       </m:sub>
                     </m:sSub>
@@ -5975,7 +6005,13 @@
                           <a:rPr lang="en-US" b="0" i="1" smtClean="0">
                             <a:latin typeface="Cambria Math" panose="02040503050406030204" pitchFamily="18" charset="0"/>
                           </a:rPr>
-                          <m:t>−1</m:t>
+                          <m:t>−</m:t>
+                        </m:r>
+                        <m:r>
+                          <a:rPr lang="en-US" b="0" i="1" smtClean="0">
+                            <a:latin typeface="Cambria Math" panose="02040503050406030204" pitchFamily="18" charset="0"/>
+                          </a:rPr>
+                          <m:t>1</m:t>
                         </m:r>
                       </m:sub>
                     </m:sSub>
@@ -6159,7 +6195,13 @@
                       <a:rPr lang="en-US" sz="2400" b="0" i="1" smtClean="0">
                         <a:latin typeface="Cambria Math" panose="02040503050406030204" pitchFamily="18" charset="0"/>
                       </a:rPr>
-                      <m:t>=0</m:t>
+                      <m:t>=</m:t>
+                    </m:r>
+                    <m:r>
+                      <a:rPr lang="en-US" sz="2400" b="0" i="1" smtClean="0">
+                        <a:latin typeface="Cambria Math" panose="02040503050406030204" pitchFamily="18" charset="0"/>
+                      </a:rPr>
+                      <m:t>0</m:t>
                     </m:r>
                   </m:oMath>
                 </a14:m>
@@ -12908,19 +12950,7 @@
                               <a:rPr lang="en-US" b="0" i="1" smtClean="0">
                                 <a:latin typeface="Cambria Math" panose="02040503050406030204" pitchFamily="18" charset="0"/>
                               </a:rPr>
-                              <m:t>0</m:t>
-                            </m:r>
-                            <m:r>
-                              <a:rPr lang="en-US" b="0" i="1" smtClean="0">
-                                <a:latin typeface="Cambria Math" panose="02040503050406030204" pitchFamily="18" charset="0"/>
-                              </a:rPr>
-                              <m:t>, </m:t>
-                            </m:r>
-                            <m:r>
-                              <a:rPr lang="en-US" b="0" i="1" smtClean="0">
-                                <a:latin typeface="Cambria Math" panose="02040503050406030204" pitchFamily="18" charset="0"/>
-                              </a:rPr>
-                              <m:t>1</m:t>
+                              <m:t>0, 1</m:t>
                             </m:r>
                           </m:e>
                         </m:d>
@@ -13033,19 +13063,7 @@
                                     <a:rPr lang="en-US" b="0" i="1" smtClean="0">
                                       <a:latin typeface="Cambria Math" panose="02040503050406030204" pitchFamily="18" charset="0"/>
                                     </a:rPr>
-                                    <m:t>0</m:t>
-                                  </m:r>
-                                  <m:r>
-                                    <a:rPr lang="en-US" b="0" i="1" smtClean="0">
-                                      <a:latin typeface="Cambria Math" panose="02040503050406030204" pitchFamily="18" charset="0"/>
-                                    </a:rPr>
-                                    <m:t>, </m:t>
-                                  </m:r>
-                                  <m:r>
-                                    <a:rPr lang="en-US" b="0" i="1" smtClean="0">
-                                      <a:latin typeface="Cambria Math" panose="02040503050406030204" pitchFamily="18" charset="0"/>
-                                    </a:rPr>
-                                    <m:t>1</m:t>
+                                    <m:t>0, 1</m:t>
                                   </m:r>
                                 </m:e>
                               </m:d>
@@ -26624,7 +26642,19 @@
                               <a:rPr lang="en-US" i="1">
                                 <a:latin typeface="Cambria Math" panose="02040503050406030204" pitchFamily="18" charset="0"/>
                               </a:rPr>
-                              <m:t>0, 1</m:t>
+                              <m:t>0</m:t>
+                            </m:r>
+                            <m:r>
+                              <a:rPr lang="en-US" i="1">
+                                <a:latin typeface="Cambria Math" panose="02040503050406030204" pitchFamily="18" charset="0"/>
+                              </a:rPr>
+                              <m:t>, </m:t>
+                            </m:r>
+                            <m:r>
+                              <a:rPr lang="en-US" i="1">
+                                <a:latin typeface="Cambria Math" panose="02040503050406030204" pitchFamily="18" charset="0"/>
+                              </a:rPr>
+                              <m:t>1</m:t>
                             </m:r>
                           </m:e>
                         </m:d>
@@ -35403,7 +35433,7 @@
               <a:p>
                 <a:r>
                   <a:rPr lang="en-US" dirty="0"/>
-                  <a:t>We think of </a:t>
+                  <a:t>Think of </a:t>
                 </a:r>
                 <a14:m>
                   <m:oMath xmlns:m="http://schemas.openxmlformats.org/officeDocument/2006/math">
@@ -35449,7 +35479,7 @@
               <a:p>
                 <a:r>
                   <a:rPr lang="en-US" dirty="0"/>
-                  <a:t>This shorthand can only be used if </a:t>
+                  <a:t>Only works if </a:t>
                 </a:r>
                 <a14:m>
                   <m:oMath xmlns:m="http://schemas.openxmlformats.org/officeDocument/2006/math">
@@ -35478,13 +35508,23 @@
                       <a:rPr lang="en-US" b="0" i="1" smtClean="0">
                         <a:latin typeface="Cambria Math" panose="02040503050406030204" pitchFamily="18" charset="0"/>
                       </a:rPr>
-                      <m:t>=∅</m:t>
+                      <m:t>=</m:t>
+                    </m:r>
+                    <m:r>
+                      <a:rPr lang="en-US" b="0" i="1" smtClean="0">
+                        <a:latin typeface="Cambria Math" panose="02040503050406030204" pitchFamily="18" charset="0"/>
+                      </a:rPr>
+                      <m:t>∅</m:t>
                     </m:r>
                   </m:oMath>
                 </a14:m>
+                <a:endParaRPr lang="en-US" dirty="0"/>
+              </a:p>
+              <a:p>
+                <a:pPr lvl="1"/>
                 <a:r>
                   <a:rPr lang="en-US" dirty="0"/>
-                  <a:t>, which we can assume without loss of generality by renaming states if necessary</a:t>
+                  <a:t>Can assume without loss of generality (rename states if necessary)</a:t>
                 </a:r>
               </a:p>
             </p:txBody>

</xml_diff>